<commit_message>
edit hw4 location and slides
</commit_message>
<xml_diff>
--- a/resources/hw/genomic-data-visualization-HW_4.pptx
+++ b/resources/hw/genomic-data-visualization-HW_4.pptx
@@ -262,7 +262,7 @@
           <a:p>
             <a:fld id="{EA7AF97D-2E4D-EC45-A828-2A00154AE3A4}" type="datetimeFigureOut">
               <a:rPr lang="en-US" smtClean="0"/>
-              <a:t>2/11/25</a:t>
+              <a:t>2/17/25</a:t>
             </a:fld>
             <a:endParaRPr lang="en-US"/>
           </a:p>
@@ -460,7 +460,7 @@
           <a:p>
             <a:fld id="{EA7AF97D-2E4D-EC45-A828-2A00154AE3A4}" type="datetimeFigureOut">
               <a:rPr lang="en-US" smtClean="0"/>
-              <a:t>2/11/25</a:t>
+              <a:t>2/17/25</a:t>
             </a:fld>
             <a:endParaRPr lang="en-US"/>
           </a:p>
@@ -668,7 +668,7 @@
           <a:p>
             <a:fld id="{EA7AF97D-2E4D-EC45-A828-2A00154AE3A4}" type="datetimeFigureOut">
               <a:rPr lang="en-US" smtClean="0"/>
-              <a:t>2/11/25</a:t>
+              <a:t>2/17/25</a:t>
             </a:fld>
             <a:endParaRPr lang="en-US"/>
           </a:p>
@@ -866,7 +866,7 @@
           <a:p>
             <a:fld id="{EA7AF97D-2E4D-EC45-A828-2A00154AE3A4}" type="datetimeFigureOut">
               <a:rPr lang="en-US" smtClean="0"/>
-              <a:t>2/11/25</a:t>
+              <a:t>2/17/25</a:t>
             </a:fld>
             <a:endParaRPr lang="en-US"/>
           </a:p>
@@ -1141,7 +1141,7 @@
           <a:p>
             <a:fld id="{EA7AF97D-2E4D-EC45-A828-2A00154AE3A4}" type="datetimeFigureOut">
               <a:rPr lang="en-US" smtClean="0"/>
-              <a:t>2/11/25</a:t>
+              <a:t>2/17/25</a:t>
             </a:fld>
             <a:endParaRPr lang="en-US"/>
           </a:p>
@@ -1406,7 +1406,7 @@
           <a:p>
             <a:fld id="{EA7AF97D-2E4D-EC45-A828-2A00154AE3A4}" type="datetimeFigureOut">
               <a:rPr lang="en-US" smtClean="0"/>
-              <a:t>2/11/25</a:t>
+              <a:t>2/17/25</a:t>
             </a:fld>
             <a:endParaRPr lang="en-US"/>
           </a:p>
@@ -1818,7 +1818,7 @@
           <a:p>
             <a:fld id="{EA7AF97D-2E4D-EC45-A828-2A00154AE3A4}" type="datetimeFigureOut">
               <a:rPr lang="en-US" smtClean="0"/>
-              <a:t>2/11/25</a:t>
+              <a:t>2/17/25</a:t>
             </a:fld>
             <a:endParaRPr lang="en-US"/>
           </a:p>
@@ -1959,7 +1959,7 @@
           <a:p>
             <a:fld id="{EA7AF97D-2E4D-EC45-A828-2A00154AE3A4}" type="datetimeFigureOut">
               <a:rPr lang="en-US" smtClean="0"/>
-              <a:t>2/11/25</a:t>
+              <a:t>2/17/25</a:t>
             </a:fld>
             <a:endParaRPr lang="en-US"/>
           </a:p>
@@ -2072,7 +2072,7 @@
           <a:p>
             <a:fld id="{EA7AF97D-2E4D-EC45-A828-2A00154AE3A4}" type="datetimeFigureOut">
               <a:rPr lang="en-US" smtClean="0"/>
-              <a:t>2/11/25</a:t>
+              <a:t>2/17/25</a:t>
             </a:fld>
             <a:endParaRPr lang="en-US"/>
           </a:p>
@@ -2383,7 +2383,7 @@
           <a:p>
             <a:fld id="{EA7AF97D-2E4D-EC45-A828-2A00154AE3A4}" type="datetimeFigureOut">
               <a:rPr lang="en-US" smtClean="0"/>
-              <a:t>2/11/25</a:t>
+              <a:t>2/17/25</a:t>
             </a:fld>
             <a:endParaRPr lang="en-US"/>
           </a:p>
@@ -2671,7 +2671,7 @@
           <a:p>
             <a:fld id="{EA7AF97D-2E4D-EC45-A828-2A00154AE3A4}" type="datetimeFigureOut">
               <a:rPr lang="en-US" smtClean="0"/>
-              <a:t>2/11/25</a:t>
+              <a:t>2/17/25</a:t>
             </a:fld>
             <a:endParaRPr lang="en-US"/>
           </a:p>
@@ -2912,7 +2912,7 @@
           <a:p>
             <a:fld id="{EA7AF97D-2E4D-EC45-A828-2A00154AE3A4}" type="datetimeFigureOut">
               <a:rPr lang="en-US" smtClean="0"/>
-              <a:t>2/11/25</a:t>
+              <a:t>2/17/25</a:t>
             </a:fld>
             <a:endParaRPr lang="en-US"/>
           </a:p>
@@ -3870,7 +3870,7 @@
                   <a:srgbClr val="404040"/>
                 </a:solidFill>
               </a:rPr>
-              <a:t>1. Save your data visualization to the homework/hw5 folder using [</a:t>
+              <a:t>1. Save your data visualization to the homework/hw4 folder using [</a:t>
             </a:r>
             <a:r>
               <a:rPr lang="en-US" sz="1800" dirty="0" err="1">
@@ -3979,23 +3979,7 @@
                   <a:srgbClr val="404040"/>
                 </a:solidFill>
               </a:rPr>
-              <a:t>	- change category to [ </a:t>
-            </a:r>
-            <a:r>
-              <a:rPr lang="en-US" sz="1800">
-                <a:solidFill>
-                  <a:srgbClr val="404040"/>
-                </a:solidFill>
-              </a:rPr>
-              <a:t>HW 5 </a:t>
-            </a:r>
-            <a:r>
-              <a:rPr lang="en-US" sz="1800" dirty="0">
-                <a:solidFill>
-                  <a:srgbClr val="404040"/>
-                </a:solidFill>
-              </a:rPr>
-              <a:t>] </a:t>
+              <a:t>	- change category to [ HW 4 ] </a:t>
             </a:r>
           </a:p>
           <a:p>

</xml_diff>